<commit_message>
Add wnlo logo with text and a cropped hust logo
</commit_message>
<xml_diff>
--- a/wnlo-logo.pptx
+++ b/wnlo-logo.pptx
@@ -199,7 +199,7 @@
           <a:p>
             <a:fld id="{B8E5C00B-BDC6-024B-9447-D3C057225367}" type="datetimeFigureOut">
               <a:rPr lang="en-CN" smtClean="0"/>
-              <a:t>2024/4/24</a:t>
+              <a:t>2025/2/13</a:t>
             </a:fld>
             <a:endParaRPr lang="en-CN"/>
           </a:p>
@@ -865,7 +865,7 @@
           <a:p>
             <a:fld id="{DEA9AB64-94FB-AC46-8AA7-C624D2F7419E}" type="datetimeFigureOut">
               <a:rPr lang="en-CN" smtClean="0"/>
-              <a:t>2024/4/24</a:t>
+              <a:t>2025/2/13</a:t>
             </a:fld>
             <a:endParaRPr lang="en-CN"/>
           </a:p>
@@ -1035,7 +1035,7 @@
           <a:p>
             <a:fld id="{DEA9AB64-94FB-AC46-8AA7-C624D2F7419E}" type="datetimeFigureOut">
               <a:rPr lang="en-CN" smtClean="0"/>
-              <a:t>2024/4/24</a:t>
+              <a:t>2025/2/13</a:t>
             </a:fld>
             <a:endParaRPr lang="en-CN"/>
           </a:p>
@@ -1215,7 +1215,7 @@
           <a:p>
             <a:fld id="{DEA9AB64-94FB-AC46-8AA7-C624D2F7419E}" type="datetimeFigureOut">
               <a:rPr lang="en-CN" smtClean="0"/>
-              <a:t>2024/4/24</a:t>
+              <a:t>2025/2/13</a:t>
             </a:fld>
             <a:endParaRPr lang="en-CN"/>
           </a:p>
@@ -1385,7 +1385,7 @@
           <a:p>
             <a:fld id="{DEA9AB64-94FB-AC46-8AA7-C624D2F7419E}" type="datetimeFigureOut">
               <a:rPr lang="en-CN" smtClean="0"/>
-              <a:t>2024/4/24</a:t>
+              <a:t>2025/2/13</a:t>
             </a:fld>
             <a:endParaRPr lang="en-CN"/>
           </a:p>
@@ -1629,7 +1629,7 @@
           <a:p>
             <a:fld id="{DEA9AB64-94FB-AC46-8AA7-C624D2F7419E}" type="datetimeFigureOut">
               <a:rPr lang="en-CN" smtClean="0"/>
-              <a:t>2024/4/24</a:t>
+              <a:t>2025/2/13</a:t>
             </a:fld>
             <a:endParaRPr lang="en-CN"/>
           </a:p>
@@ -1861,7 +1861,7 @@
           <a:p>
             <a:fld id="{DEA9AB64-94FB-AC46-8AA7-C624D2F7419E}" type="datetimeFigureOut">
               <a:rPr lang="en-CN" smtClean="0"/>
-              <a:t>2024/4/24</a:t>
+              <a:t>2025/2/13</a:t>
             </a:fld>
             <a:endParaRPr lang="en-CN"/>
           </a:p>
@@ -2228,7 +2228,7 @@
           <a:p>
             <a:fld id="{DEA9AB64-94FB-AC46-8AA7-C624D2F7419E}" type="datetimeFigureOut">
               <a:rPr lang="en-CN" smtClean="0"/>
-              <a:t>2024/4/24</a:t>
+              <a:t>2025/2/13</a:t>
             </a:fld>
             <a:endParaRPr lang="en-CN"/>
           </a:p>
@@ -2346,7 +2346,7 @@
           <a:p>
             <a:fld id="{DEA9AB64-94FB-AC46-8AA7-C624D2F7419E}" type="datetimeFigureOut">
               <a:rPr lang="en-CN" smtClean="0"/>
-              <a:t>2024/4/24</a:t>
+              <a:t>2025/2/13</a:t>
             </a:fld>
             <a:endParaRPr lang="en-CN"/>
           </a:p>
@@ -2441,7 +2441,7 @@
           <a:p>
             <a:fld id="{DEA9AB64-94FB-AC46-8AA7-C624D2F7419E}" type="datetimeFigureOut">
               <a:rPr lang="en-CN" smtClean="0"/>
-              <a:t>2024/4/24</a:t>
+              <a:t>2025/2/13</a:t>
             </a:fld>
             <a:endParaRPr lang="en-CN"/>
           </a:p>
@@ -2718,7 +2718,7 @@
           <a:p>
             <a:fld id="{DEA9AB64-94FB-AC46-8AA7-C624D2F7419E}" type="datetimeFigureOut">
               <a:rPr lang="en-CN" smtClean="0"/>
-              <a:t>2024/4/24</a:t>
+              <a:t>2025/2/13</a:t>
             </a:fld>
             <a:endParaRPr lang="en-CN"/>
           </a:p>
@@ -2975,7 +2975,7 @@
           <a:p>
             <a:fld id="{DEA9AB64-94FB-AC46-8AA7-C624D2F7419E}" type="datetimeFigureOut">
               <a:rPr lang="en-CN" smtClean="0"/>
-              <a:t>2024/4/24</a:t>
+              <a:t>2025/2/13</a:t>
             </a:fld>
             <a:endParaRPr lang="en-CN"/>
           </a:p>
@@ -3188,7 +3188,7 @@
           <a:p>
             <a:fld id="{DEA9AB64-94FB-AC46-8AA7-C624D2F7419E}" type="datetimeFigureOut">
               <a:rPr lang="en-CN" smtClean="0"/>
-              <a:t>2024/4/24</a:t>
+              <a:t>2025/2/13</a:t>
             </a:fld>
             <a:endParaRPr lang="en-CN"/>
           </a:p>
@@ -3780,7 +3780,7 @@
         </p:nvSpPr>
         <p:spPr>
           <a:xfrm>
-            <a:off x="12281583" y="17780637"/>
+            <a:off x="12265173" y="17953230"/>
             <a:ext cx="18625901" cy="3000821"/>
           </a:xfrm>
           <a:prstGeom prst="rect">
@@ -3809,7 +3809,7 @@
           <a:p>
             <a:pPr algn="dist"/>
             <a:r>
-              <a:rPr lang="en-US" sz="4400" b="1" dirty="0">
+              <a:rPr lang="en-US" sz="4400" dirty="0">
                 <a:ln w="34925">
                   <a:solidFill>
                     <a:schemeClr val="accent1"/>
@@ -3884,7 +3884,7 @@
         <p:spPr>
           <a:xfrm>
             <a:off x="14051279" y="22258221"/>
-            <a:ext cx="14954473" cy="3000821"/>
+            <a:ext cx="14954473" cy="3062377"/>
           </a:xfrm>
           <a:prstGeom prst="rect">
             <a:avLst/>
@@ -3912,7 +3912,7 @@
           <a:p>
             <a:pPr algn="dist"/>
             <a:r>
-              <a:rPr lang="en-US" sz="4400" b="1" dirty="0">
+              <a:rPr lang="en-US" sz="4800" dirty="0">
                 <a:ln w="34925">
                   <a:solidFill>
                     <a:schemeClr val="accent1"/>
@@ -4969,34 +4969,224 @@
           <a:chExt cx="0" cy="0"/>
         </a:xfrm>
       </p:grpSpPr>
-      <p:grpSp>
-        <p:nvGrpSpPr>
-          <p:cNvPr id="2" name="Group 1">
+      <p:sp>
+        <p:nvSpPr>
+          <p:cNvPr id="3" name="Donut 2">
             <a:extLst>
               <a:ext uri="{FF2B5EF4-FFF2-40B4-BE49-F238E27FC236}">
-                <a16:creationId xmlns:a16="http://schemas.microsoft.com/office/drawing/2014/main" id="{93AA2EE5-C0E0-3DA9-6F6A-FCBB4E3C0EA2}"/>
+                <a16:creationId xmlns:a16="http://schemas.microsoft.com/office/drawing/2014/main" id="{22BD2AEF-871A-A699-5A32-6BE355142221}"/>
               </a:ext>
             </a:extLst>
           </p:cNvPr>
-          <p:cNvGrpSpPr>
-            <a:grpSpLocks noChangeAspect="1"/>
-          </p:cNvGrpSpPr>
+          <p:cNvSpPr/>
+          <p:nvPr/>
+        </p:nvSpPr>
+        <p:spPr>
+          <a:xfrm>
+            <a:off x="11967972" y="3102086"/>
+            <a:ext cx="2819329" cy="2709595"/>
+          </a:xfrm>
+          <a:prstGeom prst="donut">
+            <a:avLst>
+              <a:gd name="adj" fmla="val 18672"/>
+            </a:avLst>
+          </a:prstGeom>
+          <a:solidFill>
+            <a:srgbClr val="0070C0"/>
+          </a:solidFill>
+          <a:ln w="57150">
+            <a:noFill/>
+          </a:ln>
+          <a:effectLst>
+            <a:outerShdw blurRad="50800" dist="38100" dir="2700000" sx="103000" sy="103000" algn="tl" rotWithShape="0">
+              <a:prstClr val="black">
+                <a:alpha val="40000"/>
+              </a:prstClr>
+            </a:outerShdw>
+          </a:effectLst>
+        </p:spPr>
+        <p:style>
+          <a:lnRef idx="2">
+            <a:schemeClr val="accent1">
+              <a:shade val="15000"/>
+            </a:schemeClr>
+          </a:lnRef>
+          <a:fillRef idx="1">
+            <a:schemeClr val="accent1"/>
+          </a:fillRef>
+          <a:effectRef idx="0">
+            <a:schemeClr val="accent1"/>
+          </a:effectRef>
+          <a:fontRef idx="minor">
+            <a:schemeClr val="lt1"/>
+          </a:fontRef>
+        </p:style>
+        <p:txBody>
+          <a:bodyPr rtlCol="0" anchor="ctr"/>
+          <a:lstStyle/>
+          <a:p>
+            <a:pPr algn="ctr"/>
+            <a:endParaRPr lang="en-CN" sz="3164" b="1">
+              <a:ln w="12700">
+                <a:solidFill>
+                  <a:schemeClr val="tx2">
+                    <a:lumMod val="75000"/>
+                  </a:schemeClr>
+                </a:solidFill>
+                <a:prstDash val="solid"/>
+              </a:ln>
+              <a:solidFill>
+                <a:srgbClr val="0070C0"/>
+              </a:solidFill>
+              <a:effectLst>
+                <a:outerShdw dist="38100" dir="2640000" algn="bl" rotWithShape="0">
+                  <a:schemeClr val="tx2">
+                    <a:lumMod val="75000"/>
+                  </a:schemeClr>
+                </a:outerShdw>
+              </a:effectLst>
+            </a:endParaRPr>
+          </a:p>
+        </p:txBody>
+      </p:sp>
+      <p:sp>
+        <p:nvSpPr>
+          <p:cNvPr id="4" name="TextBox 3">
+            <a:extLst>
+              <a:ext uri="{FF2B5EF4-FFF2-40B4-BE49-F238E27FC236}">
+                <a16:creationId xmlns:a16="http://schemas.microsoft.com/office/drawing/2014/main" id="{3090914C-5667-5FA0-CAA5-B7A7E7DA4E6F}"/>
+              </a:ext>
+            </a:extLst>
+          </p:cNvPr>
+          <p:cNvSpPr txBox="1"/>
+          <p:nvPr/>
+        </p:nvSpPr>
+        <p:spPr>
+          <a:xfrm>
+            <a:off x="7734654" y="2193537"/>
+            <a:ext cx="3448255" cy="4581575"/>
+          </a:xfrm>
+          <a:prstGeom prst="rect">
+            <a:avLst/>
+          </a:prstGeom>
+          <a:noFill/>
+        </p:spPr>
+        <p:txBody>
+          <a:bodyPr wrap="square" rtlCol="0">
+            <a:spAutoFit/>
+          </a:bodyPr>
+          <a:lstStyle/>
+          <a:p>
+            <a:r>
+              <a:rPr lang="en-CN" sz="29172" b="1" dirty="0">
+                <a:ln w="15875">
+                  <a:solidFill>
+                    <a:srgbClr val="FF0000"/>
+                  </a:solidFill>
+                </a:ln>
+                <a:solidFill>
+                  <a:srgbClr val="FF0000"/>
+                </a:solidFill>
+                <a:effectLst>
+                  <a:outerShdw blurRad="50800" dist="38100" dir="2700000" sx="106000" sy="106000" algn="ctr" rotWithShape="0">
+                    <a:srgbClr val="000000">
+                      <a:alpha val="43137"/>
+                    </a:srgbClr>
+                  </a:outerShdw>
+                </a:effectLst>
+                <a:latin typeface="Arial" panose="020B0604020202020204" pitchFamily="34" charset="0"/>
+                <a:cs typeface="Arial" panose="020B0604020202020204" pitchFamily="34" charset="0"/>
+              </a:rPr>
+              <a:t>W</a:t>
+            </a:r>
+          </a:p>
+        </p:txBody>
+      </p:sp>
+      <p:sp>
+        <p:nvSpPr>
+          <p:cNvPr id="5" name="Rectangle 4">
+            <a:extLst>
+              <a:ext uri="{FF2B5EF4-FFF2-40B4-BE49-F238E27FC236}">
+                <a16:creationId xmlns:a16="http://schemas.microsoft.com/office/drawing/2014/main" id="{E3E19ADE-1ACB-4EB0-2D54-112015C2FCFB}"/>
+              </a:ext>
+            </a:extLst>
+          </p:cNvPr>
+          <p:cNvSpPr/>
+          <p:nvPr/>
+        </p:nvSpPr>
+        <p:spPr>
+          <a:xfrm>
+            <a:off x="7734654" y="4417423"/>
+            <a:ext cx="3904800" cy="1776499"/>
+          </a:xfrm>
+          <a:prstGeom prst="rect">
+            <a:avLst/>
+          </a:prstGeom>
+          <a:solidFill>
+            <a:schemeClr val="bg1"/>
+          </a:solidFill>
+          <a:ln>
+            <a:noFill/>
+          </a:ln>
+        </p:spPr>
+        <p:style>
+          <a:lnRef idx="2">
+            <a:schemeClr val="accent1">
+              <a:shade val="15000"/>
+            </a:schemeClr>
+          </a:lnRef>
+          <a:fillRef idx="1">
+            <a:schemeClr val="accent1"/>
+          </a:fillRef>
+          <a:effectRef idx="0">
+            <a:schemeClr val="accent1"/>
+          </a:effectRef>
+          <a:fontRef idx="minor">
+            <a:schemeClr val="lt1"/>
+          </a:fontRef>
+        </p:style>
+        <p:txBody>
+          <a:bodyPr rtlCol="0" anchor="ctr"/>
+          <a:lstStyle/>
+          <a:p>
+            <a:pPr algn="ctr"/>
+            <a:endParaRPr lang="en-CN" sz="3164"/>
+          </a:p>
+        </p:txBody>
+      </p:sp>
+      <p:grpSp>
+        <p:nvGrpSpPr>
+          <p:cNvPr id="6" name="Group 5">
+            <a:extLst>
+              <a:ext uri="{FF2B5EF4-FFF2-40B4-BE49-F238E27FC236}">
+                <a16:creationId xmlns:a16="http://schemas.microsoft.com/office/drawing/2014/main" id="{B970AD34-7409-43B7-A434-5AC1619A2812}"/>
+              </a:ext>
+            </a:extLst>
+          </p:cNvPr>
+          <p:cNvGrpSpPr/>
           <p:nvPr/>
         </p:nvGrpSpPr>
         <p:grpSpPr>
           <a:xfrm>
-            <a:off x="7734654" y="2092133"/>
-            <a:ext cx="7941634" cy="4584123"/>
-            <a:chOff x="2322436" y="4100777"/>
-            <a:chExt cx="4524930" cy="2611914"/>
+            <a:off x="12009197" y="3079797"/>
+            <a:ext cx="3667091" cy="2735292"/>
+            <a:chOff x="4757956" y="4663522"/>
+            <a:chExt cx="2089410" cy="1558498"/>
           </a:xfrm>
+          <a:effectLst>
+            <a:outerShdw blurRad="50800" dist="50800" dir="5400000" algn="ctr" rotWithShape="0">
+              <a:srgbClr val="000000">
+                <a:alpha val="0"/>
+              </a:srgbClr>
+            </a:outerShdw>
+          </a:effectLst>
         </p:grpSpPr>
         <p:sp>
           <p:nvSpPr>
-            <p:cNvPr id="3" name="Donut 2">
+            <p:cNvPr id="9" name="Rectangle 8">
               <a:extLst>
                 <a:ext uri="{FF2B5EF4-FFF2-40B4-BE49-F238E27FC236}">
-                  <a16:creationId xmlns:a16="http://schemas.microsoft.com/office/drawing/2014/main" id="{22BD2AEF-871A-A699-5A32-6BE355142221}"/>
+                  <a16:creationId xmlns:a16="http://schemas.microsoft.com/office/drawing/2014/main" id="{7A8AB36A-CF3C-CB1E-6410-29429CB3CB5F}"/>
                 </a:ext>
               </a:extLst>
             </p:cNvPr>
@@ -5005,897 +5195,8 @@
           </p:nvSpPr>
           <p:spPr>
             <a:xfrm>
-              <a:off x="4734467" y="4676222"/>
-              <a:ext cx="1606378" cy="1543857"/>
-            </a:xfrm>
-            <a:prstGeom prst="donut">
-              <a:avLst>
-                <a:gd name="adj" fmla="val 18672"/>
-              </a:avLst>
-            </a:prstGeom>
-            <a:solidFill>
-              <a:srgbClr val="0070C0"/>
-            </a:solidFill>
-            <a:ln w="57150">
-              <a:noFill/>
-            </a:ln>
-            <a:effectLst>
-              <a:outerShdw blurRad="50800" dist="38100" dir="2700000" sx="103000" sy="103000" algn="tl" rotWithShape="0">
-                <a:prstClr val="black">
-                  <a:alpha val="40000"/>
-                </a:prstClr>
-              </a:outerShdw>
-            </a:effectLst>
-          </p:spPr>
-          <p:style>
-            <a:lnRef idx="2">
-              <a:schemeClr val="accent1">
-                <a:shade val="15000"/>
-              </a:schemeClr>
-            </a:lnRef>
-            <a:fillRef idx="1">
-              <a:schemeClr val="accent1"/>
-            </a:fillRef>
-            <a:effectRef idx="0">
-              <a:schemeClr val="accent1"/>
-            </a:effectRef>
-            <a:fontRef idx="minor">
-              <a:schemeClr val="lt1"/>
-            </a:fontRef>
-          </p:style>
-          <p:txBody>
-            <a:bodyPr rtlCol="0" anchor="ctr"/>
-            <a:lstStyle/>
-            <a:p>
-              <a:pPr algn="ctr"/>
-              <a:endParaRPr lang="en-CN" sz="3164" b="1">
-                <a:ln w="12700">
-                  <a:solidFill>
-                    <a:schemeClr val="tx2">
-                      <a:lumMod val="75000"/>
-                    </a:schemeClr>
-                  </a:solidFill>
-                  <a:prstDash val="solid"/>
-                </a:ln>
-                <a:solidFill>
-                  <a:srgbClr val="0070C0"/>
-                </a:solidFill>
-                <a:effectLst>
-                  <a:outerShdw dist="38100" dir="2640000" algn="bl" rotWithShape="0">
-                    <a:schemeClr val="tx2">
-                      <a:lumMod val="75000"/>
-                    </a:schemeClr>
-                  </a:outerShdw>
-                </a:effectLst>
-              </a:endParaRPr>
-            </a:p>
-          </p:txBody>
-        </p:sp>
-        <p:sp>
-          <p:nvSpPr>
-            <p:cNvPr id="4" name="TextBox 3">
-              <a:extLst>
-                <a:ext uri="{FF2B5EF4-FFF2-40B4-BE49-F238E27FC236}">
-                  <a16:creationId xmlns:a16="http://schemas.microsoft.com/office/drawing/2014/main" id="{3090914C-5667-5FA0-CAA5-B7A7E7DA4E6F}"/>
-                </a:ext>
-              </a:extLst>
-            </p:cNvPr>
-            <p:cNvSpPr txBox="1"/>
-            <p:nvPr/>
-          </p:nvSpPr>
-          <p:spPr>
-            <a:xfrm>
-              <a:off x="2322436" y="4102229"/>
-              <a:ext cx="1964723" cy="2610462"/>
-            </a:xfrm>
-            <a:prstGeom prst="rect">
-              <a:avLst/>
-            </a:prstGeom>
-            <a:noFill/>
-          </p:spPr>
-          <p:txBody>
-            <a:bodyPr wrap="square" rtlCol="0">
-              <a:spAutoFit/>
-            </a:bodyPr>
-            <a:lstStyle/>
-            <a:p>
-              <a:r>
-                <a:rPr lang="en-CN" sz="29172" b="1" dirty="0">
-                  <a:ln w="15875">
-                    <a:solidFill>
-                      <a:srgbClr val="FF0000"/>
-                    </a:solidFill>
-                  </a:ln>
-                  <a:solidFill>
-                    <a:srgbClr val="FF0000"/>
-                  </a:solidFill>
-                  <a:effectLst>
-                    <a:outerShdw blurRad="50800" dist="38100" dir="2700000" sx="106000" sy="106000" algn="ctr" rotWithShape="0">
-                      <a:srgbClr val="000000">
-                        <a:alpha val="43137"/>
-                      </a:srgbClr>
-                    </a:outerShdw>
-                  </a:effectLst>
-                  <a:latin typeface="Arial" panose="020B0604020202020204" pitchFamily="34" charset="0"/>
-                  <a:cs typeface="Arial" panose="020B0604020202020204" pitchFamily="34" charset="0"/>
-                </a:rPr>
-                <a:t>W</a:t>
-              </a:r>
-            </a:p>
-          </p:txBody>
-        </p:sp>
-        <p:sp>
-          <p:nvSpPr>
-            <p:cNvPr id="5" name="Rectangle 4">
-              <a:extLst>
-                <a:ext uri="{FF2B5EF4-FFF2-40B4-BE49-F238E27FC236}">
-                  <a16:creationId xmlns:a16="http://schemas.microsoft.com/office/drawing/2014/main" id="{E3E19ADE-1ACB-4EB0-2D54-112015C2FCFB}"/>
-                </a:ext>
-              </a:extLst>
-            </p:cNvPr>
-            <p:cNvSpPr/>
-            <p:nvPr/>
-          </p:nvSpPr>
-          <p:spPr>
-            <a:xfrm>
-              <a:off x="2322436" y="5425667"/>
-              <a:ext cx="2224850" cy="1012203"/>
-            </a:xfrm>
-            <a:prstGeom prst="rect">
-              <a:avLst/>
-            </a:prstGeom>
-            <a:solidFill>
-              <a:schemeClr val="bg1"/>
-            </a:solidFill>
-            <a:ln>
-              <a:noFill/>
-            </a:ln>
-          </p:spPr>
-          <p:style>
-            <a:lnRef idx="2">
-              <a:schemeClr val="accent1">
-                <a:shade val="15000"/>
-              </a:schemeClr>
-            </a:lnRef>
-            <a:fillRef idx="1">
-              <a:schemeClr val="accent1"/>
-            </a:fillRef>
-            <a:effectRef idx="0">
-              <a:schemeClr val="accent1"/>
-            </a:effectRef>
-            <a:fontRef idx="minor">
-              <a:schemeClr val="lt1"/>
-            </a:fontRef>
-          </p:style>
-          <p:txBody>
-            <a:bodyPr rtlCol="0" anchor="ctr"/>
-            <a:lstStyle/>
-            <a:p>
-              <a:pPr algn="ctr"/>
-              <a:endParaRPr lang="en-CN" sz="3164"/>
-            </a:p>
-          </p:txBody>
-        </p:sp>
-        <p:grpSp>
-          <p:nvGrpSpPr>
-            <p:cNvPr id="6" name="Group 5">
-              <a:extLst>
-                <a:ext uri="{FF2B5EF4-FFF2-40B4-BE49-F238E27FC236}">
-                  <a16:creationId xmlns:a16="http://schemas.microsoft.com/office/drawing/2014/main" id="{B970AD34-7409-43B7-A434-5AC1619A2812}"/>
-                </a:ext>
-              </a:extLst>
-            </p:cNvPr>
-            <p:cNvGrpSpPr/>
-            <p:nvPr/>
-          </p:nvGrpSpPr>
-          <p:grpSpPr>
-            <a:xfrm>
               <a:off x="4757956" y="4663522"/>
-              <a:ext cx="2089410" cy="1558498"/>
-              <a:chOff x="4757956" y="4663522"/>
-              <a:chExt cx="2089410" cy="1558498"/>
-            </a:xfrm>
-            <a:effectLst>
-              <a:outerShdw blurRad="50800" dist="50800" dir="5400000" algn="ctr" rotWithShape="0">
-                <a:srgbClr val="000000">
-                  <a:alpha val="0"/>
-                </a:srgbClr>
-              </a:outerShdw>
-            </a:effectLst>
-          </p:grpSpPr>
-          <p:sp>
-            <p:nvSpPr>
-              <p:cNvPr id="9" name="Rectangle 8">
-                <a:extLst>
-                  <a:ext uri="{FF2B5EF4-FFF2-40B4-BE49-F238E27FC236}">
-                    <a16:creationId xmlns:a16="http://schemas.microsoft.com/office/drawing/2014/main" id="{7A8AB36A-CF3C-CB1E-6410-29429CB3CB5F}"/>
-                  </a:ext>
-                </a:extLst>
-              </p:cNvPr>
-              <p:cNvSpPr/>
-              <p:nvPr/>
-            </p:nvSpPr>
-            <p:spPr>
-              <a:xfrm>
-                <a:off x="4757956" y="4663522"/>
-                <a:ext cx="2089410" cy="36000"/>
-              </a:xfrm>
-              <a:prstGeom prst="rect">
-                <a:avLst/>
-              </a:prstGeom>
-              <a:solidFill>
-                <a:schemeClr val="bg1"/>
-              </a:solidFill>
-              <a:ln>
-                <a:noFill/>
-              </a:ln>
-            </p:spPr>
-            <p:style>
-              <a:lnRef idx="2">
-                <a:schemeClr val="accent1">
-                  <a:shade val="15000"/>
-                </a:schemeClr>
-              </a:lnRef>
-              <a:fillRef idx="1">
-                <a:schemeClr val="accent1"/>
-              </a:fillRef>
-              <a:effectRef idx="0">
-                <a:schemeClr val="accent1"/>
-              </a:effectRef>
-              <a:fontRef idx="minor">
-                <a:schemeClr val="lt1"/>
-              </a:fontRef>
-            </p:style>
-            <p:txBody>
-              <a:bodyPr rtlCol="0" anchor="ctr"/>
-              <a:lstStyle/>
-              <a:p>
-                <a:pPr algn="ctr"/>
-                <a:endParaRPr lang="en-CN" sz="3164"/>
-              </a:p>
-            </p:txBody>
-          </p:sp>
-          <p:sp>
-            <p:nvSpPr>
-              <p:cNvPr id="10" name="Rectangle 9">
-                <a:extLst>
-                  <a:ext uri="{FF2B5EF4-FFF2-40B4-BE49-F238E27FC236}">
-                    <a16:creationId xmlns:a16="http://schemas.microsoft.com/office/drawing/2014/main" id="{BFFE86B8-8D64-9AA0-C357-F4303E0F3C14}"/>
-                  </a:ext>
-                </a:extLst>
-              </p:cNvPr>
-              <p:cNvSpPr/>
-              <p:nvPr/>
-            </p:nvSpPr>
-            <p:spPr>
-              <a:xfrm>
-                <a:off x="4757956" y="4917272"/>
-                <a:ext cx="2089410" cy="36000"/>
-              </a:xfrm>
-              <a:prstGeom prst="rect">
-                <a:avLst/>
-              </a:prstGeom>
-              <a:solidFill>
-                <a:schemeClr val="bg1"/>
-              </a:solidFill>
-              <a:ln>
-                <a:noFill/>
-              </a:ln>
-            </p:spPr>
-            <p:style>
-              <a:lnRef idx="2">
-                <a:schemeClr val="accent1">
-                  <a:shade val="15000"/>
-                </a:schemeClr>
-              </a:lnRef>
-              <a:fillRef idx="1">
-                <a:schemeClr val="accent1"/>
-              </a:fillRef>
-              <a:effectRef idx="0">
-                <a:schemeClr val="accent1"/>
-              </a:effectRef>
-              <a:fontRef idx="minor">
-                <a:schemeClr val="lt1"/>
-              </a:fontRef>
-            </p:style>
-            <p:txBody>
-              <a:bodyPr rtlCol="0" anchor="ctr"/>
-              <a:lstStyle/>
-              <a:p>
-                <a:pPr algn="ctr"/>
-                <a:endParaRPr lang="en-CN" sz="3164"/>
-              </a:p>
-            </p:txBody>
-          </p:sp>
-          <p:sp>
-            <p:nvSpPr>
-              <p:cNvPr id="11" name="Rectangle 10">
-                <a:extLst>
-                  <a:ext uri="{FF2B5EF4-FFF2-40B4-BE49-F238E27FC236}">
-                    <a16:creationId xmlns:a16="http://schemas.microsoft.com/office/drawing/2014/main" id="{3307F8A8-D22A-D4C4-F598-BE9DA859A27E}"/>
-                  </a:ext>
-                </a:extLst>
-              </p:cNvPr>
-              <p:cNvSpPr/>
-              <p:nvPr/>
-            </p:nvSpPr>
-            <p:spPr>
-              <a:xfrm>
-                <a:off x="4757956" y="5171022"/>
-                <a:ext cx="2089410" cy="36000"/>
-              </a:xfrm>
-              <a:prstGeom prst="rect">
-                <a:avLst/>
-              </a:prstGeom>
-              <a:solidFill>
-                <a:schemeClr val="bg1"/>
-              </a:solidFill>
-              <a:ln>
-                <a:noFill/>
-              </a:ln>
-            </p:spPr>
-            <p:style>
-              <a:lnRef idx="2">
-                <a:schemeClr val="accent1">
-                  <a:shade val="15000"/>
-                </a:schemeClr>
-              </a:lnRef>
-              <a:fillRef idx="1">
-                <a:schemeClr val="accent1"/>
-              </a:fillRef>
-              <a:effectRef idx="0">
-                <a:schemeClr val="accent1"/>
-              </a:effectRef>
-              <a:fontRef idx="minor">
-                <a:schemeClr val="lt1"/>
-              </a:fontRef>
-            </p:style>
-            <p:txBody>
-              <a:bodyPr rtlCol="0" anchor="ctr"/>
-              <a:lstStyle/>
-              <a:p>
-                <a:pPr algn="ctr"/>
-                <a:endParaRPr lang="en-CN" sz="3164"/>
-              </a:p>
-            </p:txBody>
-          </p:sp>
-          <p:sp>
-            <p:nvSpPr>
-              <p:cNvPr id="12" name="Rectangle 11">
-                <a:extLst>
-                  <a:ext uri="{FF2B5EF4-FFF2-40B4-BE49-F238E27FC236}">
-                    <a16:creationId xmlns:a16="http://schemas.microsoft.com/office/drawing/2014/main" id="{9125D6E6-69EF-6A43-6194-BBE873AF4B4B}"/>
-                  </a:ext>
-                </a:extLst>
-              </p:cNvPr>
-              <p:cNvSpPr/>
-              <p:nvPr/>
-            </p:nvSpPr>
-            <p:spPr>
-              <a:xfrm>
-                <a:off x="4757956" y="5424772"/>
-                <a:ext cx="2089410" cy="36000"/>
-              </a:xfrm>
-              <a:prstGeom prst="rect">
-                <a:avLst/>
-              </a:prstGeom>
-              <a:solidFill>
-                <a:schemeClr val="bg1"/>
-              </a:solidFill>
-              <a:ln>
-                <a:noFill/>
-              </a:ln>
-            </p:spPr>
-            <p:style>
-              <a:lnRef idx="2">
-                <a:schemeClr val="accent1">
-                  <a:shade val="15000"/>
-                </a:schemeClr>
-              </a:lnRef>
-              <a:fillRef idx="1">
-                <a:schemeClr val="accent1"/>
-              </a:fillRef>
-              <a:effectRef idx="0">
-                <a:schemeClr val="accent1"/>
-              </a:effectRef>
-              <a:fontRef idx="minor">
-                <a:schemeClr val="lt1"/>
-              </a:fontRef>
-            </p:style>
-            <p:txBody>
-              <a:bodyPr rtlCol="0" anchor="ctr"/>
-              <a:lstStyle/>
-              <a:p>
-                <a:pPr algn="ctr"/>
-                <a:endParaRPr lang="en-CN" sz="3164"/>
-              </a:p>
-            </p:txBody>
-          </p:sp>
-          <p:sp>
-            <p:nvSpPr>
-              <p:cNvPr id="13" name="Rectangle 12">
-                <a:extLst>
-                  <a:ext uri="{FF2B5EF4-FFF2-40B4-BE49-F238E27FC236}">
-                    <a16:creationId xmlns:a16="http://schemas.microsoft.com/office/drawing/2014/main" id="{8BC20FB2-7259-03F0-786F-E19DDA76C7BD}"/>
-                  </a:ext>
-                </a:extLst>
-              </p:cNvPr>
-              <p:cNvSpPr/>
-              <p:nvPr/>
-            </p:nvSpPr>
-            <p:spPr>
-              <a:xfrm>
-                <a:off x="4757956" y="5678522"/>
-                <a:ext cx="2089410" cy="36000"/>
-              </a:xfrm>
-              <a:prstGeom prst="rect">
-                <a:avLst/>
-              </a:prstGeom>
-              <a:solidFill>
-                <a:schemeClr val="bg1"/>
-              </a:solidFill>
-              <a:ln>
-                <a:noFill/>
-              </a:ln>
-            </p:spPr>
-            <p:style>
-              <a:lnRef idx="2">
-                <a:schemeClr val="accent1">
-                  <a:shade val="15000"/>
-                </a:schemeClr>
-              </a:lnRef>
-              <a:fillRef idx="1">
-                <a:schemeClr val="accent1"/>
-              </a:fillRef>
-              <a:effectRef idx="0">
-                <a:schemeClr val="accent1"/>
-              </a:effectRef>
-              <a:fontRef idx="minor">
-                <a:schemeClr val="lt1"/>
-              </a:fontRef>
-            </p:style>
-            <p:txBody>
-              <a:bodyPr rtlCol="0" anchor="ctr"/>
-              <a:lstStyle/>
-              <a:p>
-                <a:pPr algn="ctr"/>
-                <a:endParaRPr lang="en-CN" sz="3164"/>
-              </a:p>
-            </p:txBody>
-          </p:sp>
-          <p:sp>
-            <p:nvSpPr>
-              <p:cNvPr id="14" name="Rectangle 13">
-                <a:extLst>
-                  <a:ext uri="{FF2B5EF4-FFF2-40B4-BE49-F238E27FC236}">
-                    <a16:creationId xmlns:a16="http://schemas.microsoft.com/office/drawing/2014/main" id="{FCE8B684-3D86-BB75-968D-2C8972B45147}"/>
-                  </a:ext>
-                </a:extLst>
-              </p:cNvPr>
-              <p:cNvSpPr/>
-              <p:nvPr/>
-            </p:nvSpPr>
-            <p:spPr>
-              <a:xfrm>
-                <a:off x="4757956" y="5932272"/>
-                <a:ext cx="2089410" cy="36000"/>
-              </a:xfrm>
-              <a:prstGeom prst="rect">
-                <a:avLst/>
-              </a:prstGeom>
-              <a:solidFill>
-                <a:schemeClr val="bg1"/>
-              </a:solidFill>
-              <a:ln>
-                <a:noFill/>
-              </a:ln>
-            </p:spPr>
-            <p:style>
-              <a:lnRef idx="2">
-                <a:schemeClr val="accent1">
-                  <a:shade val="15000"/>
-                </a:schemeClr>
-              </a:lnRef>
-              <a:fillRef idx="1">
-                <a:schemeClr val="accent1"/>
-              </a:fillRef>
-              <a:effectRef idx="0">
-                <a:schemeClr val="accent1"/>
-              </a:effectRef>
-              <a:fontRef idx="minor">
-                <a:schemeClr val="lt1"/>
-              </a:fontRef>
-            </p:style>
-            <p:txBody>
-              <a:bodyPr rtlCol="0" anchor="ctr"/>
-              <a:lstStyle/>
-              <a:p>
-                <a:pPr algn="ctr"/>
-                <a:endParaRPr lang="en-CN" sz="3164"/>
-              </a:p>
-            </p:txBody>
-          </p:sp>
-          <p:sp>
-            <p:nvSpPr>
-              <p:cNvPr id="15" name="Rectangle 14">
-                <a:extLst>
-                  <a:ext uri="{FF2B5EF4-FFF2-40B4-BE49-F238E27FC236}">
-                    <a16:creationId xmlns:a16="http://schemas.microsoft.com/office/drawing/2014/main" id="{F55B015F-E6AB-B8D9-612F-472FDDF2B4DA}"/>
-                  </a:ext>
-                </a:extLst>
-              </p:cNvPr>
-              <p:cNvSpPr/>
-              <p:nvPr/>
-            </p:nvSpPr>
-            <p:spPr>
-              <a:xfrm>
-                <a:off x="4757956" y="4790397"/>
-                <a:ext cx="2089410" cy="36000"/>
-              </a:xfrm>
-              <a:prstGeom prst="rect">
-                <a:avLst/>
-              </a:prstGeom>
-              <a:solidFill>
-                <a:schemeClr val="bg1"/>
-              </a:solidFill>
-              <a:ln>
-                <a:noFill/>
-              </a:ln>
-            </p:spPr>
-            <p:style>
-              <a:lnRef idx="2">
-                <a:schemeClr val="accent1">
-                  <a:shade val="15000"/>
-                </a:schemeClr>
-              </a:lnRef>
-              <a:fillRef idx="1">
-                <a:schemeClr val="accent1"/>
-              </a:fillRef>
-              <a:effectRef idx="0">
-                <a:schemeClr val="accent1"/>
-              </a:effectRef>
-              <a:fontRef idx="minor">
-                <a:schemeClr val="lt1"/>
-              </a:fontRef>
-            </p:style>
-            <p:txBody>
-              <a:bodyPr rtlCol="0" anchor="ctr"/>
-              <a:lstStyle/>
-              <a:p>
-                <a:pPr algn="ctr"/>
-                <a:endParaRPr lang="en-CN" sz="3164"/>
-              </a:p>
-            </p:txBody>
-          </p:sp>
-          <p:sp>
-            <p:nvSpPr>
-              <p:cNvPr id="17" name="Rectangle 16">
-                <a:extLst>
-                  <a:ext uri="{FF2B5EF4-FFF2-40B4-BE49-F238E27FC236}">
-                    <a16:creationId xmlns:a16="http://schemas.microsoft.com/office/drawing/2014/main" id="{6AFA1AE4-8AA7-C395-EE1A-930635D40EC1}"/>
-                  </a:ext>
-                </a:extLst>
-              </p:cNvPr>
-              <p:cNvSpPr/>
-              <p:nvPr/>
-            </p:nvSpPr>
-            <p:spPr>
-              <a:xfrm>
-                <a:off x="4757956" y="5044147"/>
-                <a:ext cx="2089410" cy="36000"/>
-              </a:xfrm>
-              <a:prstGeom prst="rect">
-                <a:avLst/>
-              </a:prstGeom>
-              <a:solidFill>
-                <a:schemeClr val="bg1"/>
-              </a:solidFill>
-              <a:ln>
-                <a:noFill/>
-              </a:ln>
-            </p:spPr>
-            <p:style>
-              <a:lnRef idx="2">
-                <a:schemeClr val="accent1">
-                  <a:shade val="15000"/>
-                </a:schemeClr>
-              </a:lnRef>
-              <a:fillRef idx="1">
-                <a:schemeClr val="accent1"/>
-              </a:fillRef>
-              <a:effectRef idx="0">
-                <a:schemeClr val="accent1"/>
-              </a:effectRef>
-              <a:fontRef idx="minor">
-                <a:schemeClr val="lt1"/>
-              </a:fontRef>
-            </p:style>
-            <p:txBody>
-              <a:bodyPr rtlCol="0" anchor="ctr"/>
-              <a:lstStyle/>
-              <a:p>
-                <a:pPr algn="ctr"/>
-                <a:endParaRPr lang="en-CN" sz="3164"/>
-              </a:p>
-            </p:txBody>
-          </p:sp>
-          <p:sp>
-            <p:nvSpPr>
-              <p:cNvPr id="24" name="Rectangle 23">
-                <a:extLst>
-                  <a:ext uri="{FF2B5EF4-FFF2-40B4-BE49-F238E27FC236}">
-                    <a16:creationId xmlns:a16="http://schemas.microsoft.com/office/drawing/2014/main" id="{AAD9CBA8-2A9D-6051-2E56-17A9297E90FF}"/>
-                  </a:ext>
-                </a:extLst>
-              </p:cNvPr>
-              <p:cNvSpPr/>
-              <p:nvPr/>
-            </p:nvSpPr>
-            <p:spPr>
-              <a:xfrm>
-                <a:off x="4757956" y="5297897"/>
-                <a:ext cx="2089410" cy="36000"/>
-              </a:xfrm>
-              <a:prstGeom prst="rect">
-                <a:avLst/>
-              </a:prstGeom>
-              <a:solidFill>
-                <a:schemeClr val="bg1"/>
-              </a:solidFill>
-              <a:ln>
-                <a:noFill/>
-              </a:ln>
-            </p:spPr>
-            <p:style>
-              <a:lnRef idx="2">
-                <a:schemeClr val="accent1">
-                  <a:shade val="15000"/>
-                </a:schemeClr>
-              </a:lnRef>
-              <a:fillRef idx="1">
-                <a:schemeClr val="accent1"/>
-              </a:fillRef>
-              <a:effectRef idx="0">
-                <a:schemeClr val="accent1"/>
-              </a:effectRef>
-              <a:fontRef idx="minor">
-                <a:schemeClr val="lt1"/>
-              </a:fontRef>
-            </p:style>
-            <p:txBody>
-              <a:bodyPr rtlCol="0" anchor="ctr"/>
-              <a:lstStyle/>
-              <a:p>
-                <a:pPr algn="ctr"/>
-                <a:endParaRPr lang="en-CN" sz="3164"/>
-              </a:p>
-            </p:txBody>
-          </p:sp>
-          <p:sp>
-            <p:nvSpPr>
-              <p:cNvPr id="26" name="Rectangle 25">
-                <a:extLst>
-                  <a:ext uri="{FF2B5EF4-FFF2-40B4-BE49-F238E27FC236}">
-                    <a16:creationId xmlns:a16="http://schemas.microsoft.com/office/drawing/2014/main" id="{C36C8F90-51EF-FF94-9ECB-E180DFC22106}"/>
-                  </a:ext>
-                </a:extLst>
-              </p:cNvPr>
-              <p:cNvSpPr/>
-              <p:nvPr/>
-            </p:nvSpPr>
-            <p:spPr>
-              <a:xfrm>
-                <a:off x="4757956" y="5551647"/>
-                <a:ext cx="2089410" cy="36000"/>
-              </a:xfrm>
-              <a:prstGeom prst="rect">
-                <a:avLst/>
-              </a:prstGeom>
-              <a:solidFill>
-                <a:schemeClr val="bg1"/>
-              </a:solidFill>
-              <a:ln>
-                <a:noFill/>
-              </a:ln>
-            </p:spPr>
-            <p:style>
-              <a:lnRef idx="2">
-                <a:schemeClr val="accent1">
-                  <a:shade val="15000"/>
-                </a:schemeClr>
-              </a:lnRef>
-              <a:fillRef idx="1">
-                <a:schemeClr val="accent1"/>
-              </a:fillRef>
-              <a:effectRef idx="0">
-                <a:schemeClr val="accent1"/>
-              </a:effectRef>
-              <a:fontRef idx="minor">
-                <a:schemeClr val="lt1"/>
-              </a:fontRef>
-            </p:style>
-            <p:txBody>
-              <a:bodyPr rtlCol="0" anchor="ctr"/>
-              <a:lstStyle/>
-              <a:p>
-                <a:pPr algn="ctr"/>
-                <a:endParaRPr lang="en-CN" sz="3164"/>
-              </a:p>
-            </p:txBody>
-          </p:sp>
-          <p:sp>
-            <p:nvSpPr>
-              <p:cNvPr id="27" name="Rectangle 26">
-                <a:extLst>
-                  <a:ext uri="{FF2B5EF4-FFF2-40B4-BE49-F238E27FC236}">
-                    <a16:creationId xmlns:a16="http://schemas.microsoft.com/office/drawing/2014/main" id="{2CDC9B87-77AF-6744-79D6-A29D972D73D9}"/>
-                  </a:ext>
-                </a:extLst>
-              </p:cNvPr>
-              <p:cNvSpPr/>
-              <p:nvPr/>
-            </p:nvSpPr>
-            <p:spPr>
-              <a:xfrm>
-                <a:off x="4757956" y="5805397"/>
-                <a:ext cx="2089410" cy="36000"/>
-              </a:xfrm>
-              <a:prstGeom prst="rect">
-                <a:avLst/>
-              </a:prstGeom>
-              <a:solidFill>
-                <a:schemeClr val="bg1"/>
-              </a:solidFill>
-              <a:ln>
-                <a:noFill/>
-              </a:ln>
-            </p:spPr>
-            <p:style>
-              <a:lnRef idx="2">
-                <a:schemeClr val="accent1">
-                  <a:shade val="15000"/>
-                </a:schemeClr>
-              </a:lnRef>
-              <a:fillRef idx="1">
-                <a:schemeClr val="accent1"/>
-              </a:fillRef>
-              <a:effectRef idx="0">
-                <a:schemeClr val="accent1"/>
-              </a:effectRef>
-              <a:fontRef idx="minor">
-                <a:schemeClr val="lt1"/>
-              </a:fontRef>
-            </p:style>
-            <p:txBody>
-              <a:bodyPr rtlCol="0" anchor="ctr"/>
-              <a:lstStyle/>
-              <a:p>
-                <a:pPr algn="ctr"/>
-                <a:endParaRPr lang="en-CN" sz="3164"/>
-              </a:p>
-            </p:txBody>
-          </p:sp>
-          <p:sp>
-            <p:nvSpPr>
-              <p:cNvPr id="29" name="Rectangle 28">
-                <a:extLst>
-                  <a:ext uri="{FF2B5EF4-FFF2-40B4-BE49-F238E27FC236}">
-                    <a16:creationId xmlns:a16="http://schemas.microsoft.com/office/drawing/2014/main" id="{4D8CC513-9CD5-E09E-FFF3-3908E26ECC4F}"/>
-                  </a:ext>
-                </a:extLst>
-              </p:cNvPr>
-              <p:cNvSpPr/>
-              <p:nvPr/>
-            </p:nvSpPr>
-            <p:spPr>
-              <a:xfrm>
-                <a:off x="4757956" y="6059147"/>
-                <a:ext cx="2089410" cy="36000"/>
-              </a:xfrm>
-              <a:prstGeom prst="rect">
-                <a:avLst/>
-              </a:prstGeom>
-              <a:solidFill>
-                <a:schemeClr val="bg1"/>
-              </a:solidFill>
-              <a:ln>
-                <a:noFill/>
-              </a:ln>
-            </p:spPr>
-            <p:style>
-              <a:lnRef idx="2">
-                <a:schemeClr val="accent1">
-                  <a:shade val="15000"/>
-                </a:schemeClr>
-              </a:lnRef>
-              <a:fillRef idx="1">
-                <a:schemeClr val="accent1"/>
-              </a:fillRef>
-              <a:effectRef idx="0">
-                <a:schemeClr val="accent1"/>
-              </a:effectRef>
-              <a:fontRef idx="minor">
-                <a:schemeClr val="lt1"/>
-              </a:fontRef>
-            </p:style>
-            <p:txBody>
-              <a:bodyPr rtlCol="0" anchor="ctr"/>
-              <a:lstStyle/>
-              <a:p>
-                <a:pPr algn="ctr"/>
-                <a:endParaRPr lang="en-CN" sz="3164"/>
-              </a:p>
-            </p:txBody>
-          </p:sp>
-          <p:sp>
-            <p:nvSpPr>
-              <p:cNvPr id="35" name="Rectangle 34">
-                <a:extLst>
-                  <a:ext uri="{FF2B5EF4-FFF2-40B4-BE49-F238E27FC236}">
-                    <a16:creationId xmlns:a16="http://schemas.microsoft.com/office/drawing/2014/main" id="{A39E15FF-4F01-6BA3-531C-6303BDBB684D}"/>
-                  </a:ext>
-                </a:extLst>
-              </p:cNvPr>
-              <p:cNvSpPr/>
-              <p:nvPr/>
-            </p:nvSpPr>
-            <p:spPr>
-              <a:xfrm>
-                <a:off x="4757956" y="6186020"/>
-                <a:ext cx="2089410" cy="36000"/>
-              </a:xfrm>
-              <a:prstGeom prst="rect">
-                <a:avLst/>
-              </a:prstGeom>
-              <a:solidFill>
-                <a:schemeClr val="bg1"/>
-              </a:solidFill>
-              <a:ln>
-                <a:noFill/>
-              </a:ln>
-            </p:spPr>
-            <p:style>
-              <a:lnRef idx="2">
-                <a:schemeClr val="accent1">
-                  <a:shade val="15000"/>
-                </a:schemeClr>
-              </a:lnRef>
-              <a:fillRef idx="1">
-                <a:schemeClr val="accent1"/>
-              </a:fillRef>
-              <a:effectRef idx="0">
-                <a:schemeClr val="accent1"/>
-              </a:effectRef>
-              <a:fontRef idx="minor">
-                <a:schemeClr val="lt1"/>
-              </a:fontRef>
-            </p:style>
-            <p:txBody>
-              <a:bodyPr rtlCol="0" anchor="ctr"/>
-              <a:lstStyle/>
-              <a:p>
-                <a:pPr algn="ctr"/>
-                <a:endParaRPr lang="en-CN" sz="3164"/>
-              </a:p>
-            </p:txBody>
-          </p:sp>
-        </p:grpSp>
-        <p:sp>
-          <p:nvSpPr>
-            <p:cNvPr id="7" name="Rectangle 6">
-              <a:extLst>
-                <a:ext uri="{FF2B5EF4-FFF2-40B4-BE49-F238E27FC236}">
-                  <a16:creationId xmlns:a16="http://schemas.microsoft.com/office/drawing/2014/main" id="{15EC01DB-882E-D794-CC54-2A90147D0454}"/>
-                </a:ext>
-              </a:extLst>
-            </p:cNvPr>
-            <p:cNvSpPr/>
-            <p:nvPr/>
-          </p:nvSpPr>
-          <p:spPr>
-            <a:xfrm>
-              <a:off x="2940908" y="4522573"/>
-              <a:ext cx="1606378" cy="1161535"/>
+              <a:ext cx="2089410" cy="36000"/>
             </a:xfrm>
             <a:prstGeom prst="rect">
               <a:avLst/>
@@ -5934,67 +5235,723 @@
         </p:sp>
         <p:sp>
           <p:nvSpPr>
-            <p:cNvPr id="8" name="TextBox 7">
+            <p:cNvPr id="10" name="Rectangle 9">
               <a:extLst>
                 <a:ext uri="{FF2B5EF4-FFF2-40B4-BE49-F238E27FC236}">
-                  <a16:creationId xmlns:a16="http://schemas.microsoft.com/office/drawing/2014/main" id="{1663AFF3-090B-44A8-0FCC-E28E0200DA76}"/>
+                  <a16:creationId xmlns:a16="http://schemas.microsoft.com/office/drawing/2014/main" id="{BFFE86B8-8D64-9AA0-C357-F4303E0F3C14}"/>
                 </a:ext>
               </a:extLst>
             </p:cNvPr>
-            <p:cNvSpPr txBox="1">
-              <a:spLocks noChangeAspect="1"/>
-            </p:cNvSpPr>
+            <p:cNvSpPr/>
             <p:nvPr/>
           </p:nvSpPr>
           <p:spPr>
             <a:xfrm>
-              <a:off x="2730240" y="4100777"/>
-              <a:ext cx="2707905" cy="2591817"/>
+              <a:off x="4757956" y="4917272"/>
+              <a:ext cx="2089410" cy="36000"/>
             </a:xfrm>
             <a:prstGeom prst="rect">
               <a:avLst/>
             </a:prstGeom>
-            <a:noFill/>
-            <a:ln w="57150">
+            <a:solidFill>
+              <a:schemeClr val="bg1"/>
+            </a:solidFill>
+            <a:ln>
               <a:noFill/>
             </a:ln>
-            <a:effectLst>
-              <a:outerShdw blurRad="50800" dist="38100" dir="2700000" algn="tl" rotWithShape="0">
-                <a:prstClr val="black">
-                  <a:alpha val="40000"/>
-                </a:prstClr>
-              </a:outerShdw>
-            </a:effectLst>
           </p:spPr>
+          <p:style>
+            <a:lnRef idx="2">
+              <a:schemeClr val="accent1">
+                <a:shade val="15000"/>
+              </a:schemeClr>
+            </a:lnRef>
+            <a:fillRef idx="1">
+              <a:schemeClr val="accent1"/>
+            </a:fillRef>
+            <a:effectRef idx="0">
+              <a:schemeClr val="accent1"/>
+            </a:effectRef>
+            <a:fontRef idx="minor">
+              <a:schemeClr val="lt1"/>
+            </a:fontRef>
+          </p:style>
           <p:txBody>
-            <a:bodyPr wrap="none" rtlCol="0">
-              <a:normAutofit/>
-            </a:bodyPr>
+            <a:bodyPr rtlCol="0" anchor="ctr"/>
             <a:lstStyle/>
             <a:p>
-              <a:r>
-                <a:rPr lang="en-CN" sz="29172" b="1" i="1" kern="800" spc="-1404" dirty="0">
-                  <a:ln w="15875">
-                    <a:solidFill>
-                      <a:srgbClr val="0070C0"/>
-                    </a:solidFill>
-                  </a:ln>
-                  <a:solidFill>
-                    <a:srgbClr val="0070C0"/>
-                  </a:solidFill>
-                  <a:effectLst>
-                    <a:outerShdw blurRad="50800" dist="38100" dir="2700000" sx="109000" sy="109000" algn="ctr" rotWithShape="0">
-                      <a:srgbClr val="000000">
-                        <a:alpha val="43137"/>
-                      </a:srgbClr>
-                    </a:outerShdw>
-                  </a:effectLst>
-                  <a:latin typeface="Arial" panose="020B0604020202020204" pitchFamily="34" charset="0"/>
-                  <a:cs typeface="Arial" panose="020B0604020202020204" pitchFamily="34" charset="0"/>
-                </a:rPr>
-                <a:t>NL</a:t>
-              </a:r>
-              <a:endParaRPr lang="en-CN" sz="20209" b="1" i="1" kern="800" spc="-1404" dirty="0">
+              <a:pPr algn="ctr"/>
+              <a:endParaRPr lang="en-CN" sz="3164"/>
+            </a:p>
+          </p:txBody>
+        </p:sp>
+        <p:sp>
+          <p:nvSpPr>
+            <p:cNvPr id="11" name="Rectangle 10">
+              <a:extLst>
+                <a:ext uri="{FF2B5EF4-FFF2-40B4-BE49-F238E27FC236}">
+                  <a16:creationId xmlns:a16="http://schemas.microsoft.com/office/drawing/2014/main" id="{3307F8A8-D22A-D4C4-F598-BE9DA859A27E}"/>
+                </a:ext>
+              </a:extLst>
+            </p:cNvPr>
+            <p:cNvSpPr/>
+            <p:nvPr/>
+          </p:nvSpPr>
+          <p:spPr>
+            <a:xfrm>
+              <a:off x="4757956" y="5171022"/>
+              <a:ext cx="2089410" cy="36000"/>
+            </a:xfrm>
+            <a:prstGeom prst="rect">
+              <a:avLst/>
+            </a:prstGeom>
+            <a:solidFill>
+              <a:schemeClr val="bg1"/>
+            </a:solidFill>
+            <a:ln>
+              <a:noFill/>
+            </a:ln>
+          </p:spPr>
+          <p:style>
+            <a:lnRef idx="2">
+              <a:schemeClr val="accent1">
+                <a:shade val="15000"/>
+              </a:schemeClr>
+            </a:lnRef>
+            <a:fillRef idx="1">
+              <a:schemeClr val="accent1"/>
+            </a:fillRef>
+            <a:effectRef idx="0">
+              <a:schemeClr val="accent1"/>
+            </a:effectRef>
+            <a:fontRef idx="minor">
+              <a:schemeClr val="lt1"/>
+            </a:fontRef>
+          </p:style>
+          <p:txBody>
+            <a:bodyPr rtlCol="0" anchor="ctr"/>
+            <a:lstStyle/>
+            <a:p>
+              <a:pPr algn="ctr"/>
+              <a:endParaRPr lang="en-CN" sz="3164"/>
+            </a:p>
+          </p:txBody>
+        </p:sp>
+        <p:sp>
+          <p:nvSpPr>
+            <p:cNvPr id="12" name="Rectangle 11">
+              <a:extLst>
+                <a:ext uri="{FF2B5EF4-FFF2-40B4-BE49-F238E27FC236}">
+                  <a16:creationId xmlns:a16="http://schemas.microsoft.com/office/drawing/2014/main" id="{9125D6E6-69EF-6A43-6194-BBE873AF4B4B}"/>
+                </a:ext>
+              </a:extLst>
+            </p:cNvPr>
+            <p:cNvSpPr/>
+            <p:nvPr/>
+          </p:nvSpPr>
+          <p:spPr>
+            <a:xfrm>
+              <a:off x="4757956" y="5424772"/>
+              <a:ext cx="2089410" cy="36000"/>
+            </a:xfrm>
+            <a:prstGeom prst="rect">
+              <a:avLst/>
+            </a:prstGeom>
+            <a:solidFill>
+              <a:schemeClr val="bg1"/>
+            </a:solidFill>
+            <a:ln>
+              <a:noFill/>
+            </a:ln>
+          </p:spPr>
+          <p:style>
+            <a:lnRef idx="2">
+              <a:schemeClr val="accent1">
+                <a:shade val="15000"/>
+              </a:schemeClr>
+            </a:lnRef>
+            <a:fillRef idx="1">
+              <a:schemeClr val="accent1"/>
+            </a:fillRef>
+            <a:effectRef idx="0">
+              <a:schemeClr val="accent1"/>
+            </a:effectRef>
+            <a:fontRef idx="minor">
+              <a:schemeClr val="lt1"/>
+            </a:fontRef>
+          </p:style>
+          <p:txBody>
+            <a:bodyPr rtlCol="0" anchor="ctr"/>
+            <a:lstStyle/>
+            <a:p>
+              <a:pPr algn="ctr"/>
+              <a:endParaRPr lang="en-CN" sz="3164"/>
+            </a:p>
+          </p:txBody>
+        </p:sp>
+        <p:sp>
+          <p:nvSpPr>
+            <p:cNvPr id="13" name="Rectangle 12">
+              <a:extLst>
+                <a:ext uri="{FF2B5EF4-FFF2-40B4-BE49-F238E27FC236}">
+                  <a16:creationId xmlns:a16="http://schemas.microsoft.com/office/drawing/2014/main" id="{8BC20FB2-7259-03F0-786F-E19DDA76C7BD}"/>
+                </a:ext>
+              </a:extLst>
+            </p:cNvPr>
+            <p:cNvSpPr/>
+            <p:nvPr/>
+          </p:nvSpPr>
+          <p:spPr>
+            <a:xfrm>
+              <a:off x="4757956" y="5678522"/>
+              <a:ext cx="2089410" cy="36000"/>
+            </a:xfrm>
+            <a:prstGeom prst="rect">
+              <a:avLst/>
+            </a:prstGeom>
+            <a:solidFill>
+              <a:schemeClr val="bg1"/>
+            </a:solidFill>
+            <a:ln>
+              <a:noFill/>
+            </a:ln>
+          </p:spPr>
+          <p:style>
+            <a:lnRef idx="2">
+              <a:schemeClr val="accent1">
+                <a:shade val="15000"/>
+              </a:schemeClr>
+            </a:lnRef>
+            <a:fillRef idx="1">
+              <a:schemeClr val="accent1"/>
+            </a:fillRef>
+            <a:effectRef idx="0">
+              <a:schemeClr val="accent1"/>
+            </a:effectRef>
+            <a:fontRef idx="minor">
+              <a:schemeClr val="lt1"/>
+            </a:fontRef>
+          </p:style>
+          <p:txBody>
+            <a:bodyPr rtlCol="0" anchor="ctr"/>
+            <a:lstStyle/>
+            <a:p>
+              <a:pPr algn="ctr"/>
+              <a:endParaRPr lang="en-CN" sz="3164"/>
+            </a:p>
+          </p:txBody>
+        </p:sp>
+        <p:sp>
+          <p:nvSpPr>
+            <p:cNvPr id="14" name="Rectangle 13">
+              <a:extLst>
+                <a:ext uri="{FF2B5EF4-FFF2-40B4-BE49-F238E27FC236}">
+                  <a16:creationId xmlns:a16="http://schemas.microsoft.com/office/drawing/2014/main" id="{FCE8B684-3D86-BB75-968D-2C8972B45147}"/>
+                </a:ext>
+              </a:extLst>
+            </p:cNvPr>
+            <p:cNvSpPr/>
+            <p:nvPr/>
+          </p:nvSpPr>
+          <p:spPr>
+            <a:xfrm>
+              <a:off x="4757956" y="5932272"/>
+              <a:ext cx="2089410" cy="36000"/>
+            </a:xfrm>
+            <a:prstGeom prst="rect">
+              <a:avLst/>
+            </a:prstGeom>
+            <a:solidFill>
+              <a:schemeClr val="bg1"/>
+            </a:solidFill>
+            <a:ln>
+              <a:noFill/>
+            </a:ln>
+          </p:spPr>
+          <p:style>
+            <a:lnRef idx="2">
+              <a:schemeClr val="accent1">
+                <a:shade val="15000"/>
+              </a:schemeClr>
+            </a:lnRef>
+            <a:fillRef idx="1">
+              <a:schemeClr val="accent1"/>
+            </a:fillRef>
+            <a:effectRef idx="0">
+              <a:schemeClr val="accent1"/>
+            </a:effectRef>
+            <a:fontRef idx="minor">
+              <a:schemeClr val="lt1"/>
+            </a:fontRef>
+          </p:style>
+          <p:txBody>
+            <a:bodyPr rtlCol="0" anchor="ctr"/>
+            <a:lstStyle/>
+            <a:p>
+              <a:pPr algn="ctr"/>
+              <a:endParaRPr lang="en-CN" sz="3164"/>
+            </a:p>
+          </p:txBody>
+        </p:sp>
+        <p:sp>
+          <p:nvSpPr>
+            <p:cNvPr id="15" name="Rectangle 14">
+              <a:extLst>
+                <a:ext uri="{FF2B5EF4-FFF2-40B4-BE49-F238E27FC236}">
+                  <a16:creationId xmlns:a16="http://schemas.microsoft.com/office/drawing/2014/main" id="{F55B015F-E6AB-B8D9-612F-472FDDF2B4DA}"/>
+                </a:ext>
+              </a:extLst>
+            </p:cNvPr>
+            <p:cNvSpPr/>
+            <p:nvPr/>
+          </p:nvSpPr>
+          <p:spPr>
+            <a:xfrm>
+              <a:off x="4757956" y="4790397"/>
+              <a:ext cx="2089410" cy="36000"/>
+            </a:xfrm>
+            <a:prstGeom prst="rect">
+              <a:avLst/>
+            </a:prstGeom>
+            <a:solidFill>
+              <a:schemeClr val="bg1"/>
+            </a:solidFill>
+            <a:ln>
+              <a:noFill/>
+            </a:ln>
+          </p:spPr>
+          <p:style>
+            <a:lnRef idx="2">
+              <a:schemeClr val="accent1">
+                <a:shade val="15000"/>
+              </a:schemeClr>
+            </a:lnRef>
+            <a:fillRef idx="1">
+              <a:schemeClr val="accent1"/>
+            </a:fillRef>
+            <a:effectRef idx="0">
+              <a:schemeClr val="accent1"/>
+            </a:effectRef>
+            <a:fontRef idx="minor">
+              <a:schemeClr val="lt1"/>
+            </a:fontRef>
+          </p:style>
+          <p:txBody>
+            <a:bodyPr rtlCol="0" anchor="ctr"/>
+            <a:lstStyle/>
+            <a:p>
+              <a:pPr algn="ctr"/>
+              <a:endParaRPr lang="en-CN" sz="3164"/>
+            </a:p>
+          </p:txBody>
+        </p:sp>
+        <p:sp>
+          <p:nvSpPr>
+            <p:cNvPr id="17" name="Rectangle 16">
+              <a:extLst>
+                <a:ext uri="{FF2B5EF4-FFF2-40B4-BE49-F238E27FC236}">
+                  <a16:creationId xmlns:a16="http://schemas.microsoft.com/office/drawing/2014/main" id="{6AFA1AE4-8AA7-C395-EE1A-930635D40EC1}"/>
+                </a:ext>
+              </a:extLst>
+            </p:cNvPr>
+            <p:cNvSpPr/>
+            <p:nvPr/>
+          </p:nvSpPr>
+          <p:spPr>
+            <a:xfrm>
+              <a:off x="4757956" y="5044147"/>
+              <a:ext cx="2089410" cy="36000"/>
+            </a:xfrm>
+            <a:prstGeom prst="rect">
+              <a:avLst/>
+            </a:prstGeom>
+            <a:solidFill>
+              <a:schemeClr val="bg1"/>
+            </a:solidFill>
+            <a:ln>
+              <a:noFill/>
+            </a:ln>
+          </p:spPr>
+          <p:style>
+            <a:lnRef idx="2">
+              <a:schemeClr val="accent1">
+                <a:shade val="15000"/>
+              </a:schemeClr>
+            </a:lnRef>
+            <a:fillRef idx="1">
+              <a:schemeClr val="accent1"/>
+            </a:fillRef>
+            <a:effectRef idx="0">
+              <a:schemeClr val="accent1"/>
+            </a:effectRef>
+            <a:fontRef idx="minor">
+              <a:schemeClr val="lt1"/>
+            </a:fontRef>
+          </p:style>
+          <p:txBody>
+            <a:bodyPr rtlCol="0" anchor="ctr"/>
+            <a:lstStyle/>
+            <a:p>
+              <a:pPr algn="ctr"/>
+              <a:endParaRPr lang="en-CN" sz="3164"/>
+            </a:p>
+          </p:txBody>
+        </p:sp>
+        <p:sp>
+          <p:nvSpPr>
+            <p:cNvPr id="24" name="Rectangle 23">
+              <a:extLst>
+                <a:ext uri="{FF2B5EF4-FFF2-40B4-BE49-F238E27FC236}">
+                  <a16:creationId xmlns:a16="http://schemas.microsoft.com/office/drawing/2014/main" id="{AAD9CBA8-2A9D-6051-2E56-17A9297E90FF}"/>
+                </a:ext>
+              </a:extLst>
+            </p:cNvPr>
+            <p:cNvSpPr/>
+            <p:nvPr/>
+          </p:nvSpPr>
+          <p:spPr>
+            <a:xfrm>
+              <a:off x="4757956" y="5297897"/>
+              <a:ext cx="2089410" cy="36000"/>
+            </a:xfrm>
+            <a:prstGeom prst="rect">
+              <a:avLst/>
+            </a:prstGeom>
+            <a:solidFill>
+              <a:schemeClr val="bg1"/>
+            </a:solidFill>
+            <a:ln>
+              <a:noFill/>
+            </a:ln>
+          </p:spPr>
+          <p:style>
+            <a:lnRef idx="2">
+              <a:schemeClr val="accent1">
+                <a:shade val="15000"/>
+              </a:schemeClr>
+            </a:lnRef>
+            <a:fillRef idx="1">
+              <a:schemeClr val="accent1"/>
+            </a:fillRef>
+            <a:effectRef idx="0">
+              <a:schemeClr val="accent1"/>
+            </a:effectRef>
+            <a:fontRef idx="minor">
+              <a:schemeClr val="lt1"/>
+            </a:fontRef>
+          </p:style>
+          <p:txBody>
+            <a:bodyPr rtlCol="0" anchor="ctr"/>
+            <a:lstStyle/>
+            <a:p>
+              <a:pPr algn="ctr"/>
+              <a:endParaRPr lang="en-CN" sz="3164"/>
+            </a:p>
+          </p:txBody>
+        </p:sp>
+        <p:sp>
+          <p:nvSpPr>
+            <p:cNvPr id="26" name="Rectangle 25">
+              <a:extLst>
+                <a:ext uri="{FF2B5EF4-FFF2-40B4-BE49-F238E27FC236}">
+                  <a16:creationId xmlns:a16="http://schemas.microsoft.com/office/drawing/2014/main" id="{C36C8F90-51EF-FF94-9ECB-E180DFC22106}"/>
+                </a:ext>
+              </a:extLst>
+            </p:cNvPr>
+            <p:cNvSpPr/>
+            <p:nvPr/>
+          </p:nvSpPr>
+          <p:spPr>
+            <a:xfrm>
+              <a:off x="4757956" y="5551647"/>
+              <a:ext cx="2089410" cy="36000"/>
+            </a:xfrm>
+            <a:prstGeom prst="rect">
+              <a:avLst/>
+            </a:prstGeom>
+            <a:solidFill>
+              <a:schemeClr val="bg1"/>
+            </a:solidFill>
+            <a:ln>
+              <a:noFill/>
+            </a:ln>
+          </p:spPr>
+          <p:style>
+            <a:lnRef idx="2">
+              <a:schemeClr val="accent1">
+                <a:shade val="15000"/>
+              </a:schemeClr>
+            </a:lnRef>
+            <a:fillRef idx="1">
+              <a:schemeClr val="accent1"/>
+            </a:fillRef>
+            <a:effectRef idx="0">
+              <a:schemeClr val="accent1"/>
+            </a:effectRef>
+            <a:fontRef idx="minor">
+              <a:schemeClr val="lt1"/>
+            </a:fontRef>
+          </p:style>
+          <p:txBody>
+            <a:bodyPr rtlCol="0" anchor="ctr"/>
+            <a:lstStyle/>
+            <a:p>
+              <a:pPr algn="ctr"/>
+              <a:endParaRPr lang="en-CN" sz="3164"/>
+            </a:p>
+          </p:txBody>
+        </p:sp>
+        <p:sp>
+          <p:nvSpPr>
+            <p:cNvPr id="27" name="Rectangle 26">
+              <a:extLst>
+                <a:ext uri="{FF2B5EF4-FFF2-40B4-BE49-F238E27FC236}">
+                  <a16:creationId xmlns:a16="http://schemas.microsoft.com/office/drawing/2014/main" id="{2CDC9B87-77AF-6744-79D6-A29D972D73D9}"/>
+                </a:ext>
+              </a:extLst>
+            </p:cNvPr>
+            <p:cNvSpPr/>
+            <p:nvPr/>
+          </p:nvSpPr>
+          <p:spPr>
+            <a:xfrm>
+              <a:off x="4757956" y="5805397"/>
+              <a:ext cx="2089410" cy="36000"/>
+            </a:xfrm>
+            <a:prstGeom prst="rect">
+              <a:avLst/>
+            </a:prstGeom>
+            <a:solidFill>
+              <a:schemeClr val="bg1"/>
+            </a:solidFill>
+            <a:ln>
+              <a:noFill/>
+            </a:ln>
+          </p:spPr>
+          <p:style>
+            <a:lnRef idx="2">
+              <a:schemeClr val="accent1">
+                <a:shade val="15000"/>
+              </a:schemeClr>
+            </a:lnRef>
+            <a:fillRef idx="1">
+              <a:schemeClr val="accent1"/>
+            </a:fillRef>
+            <a:effectRef idx="0">
+              <a:schemeClr val="accent1"/>
+            </a:effectRef>
+            <a:fontRef idx="minor">
+              <a:schemeClr val="lt1"/>
+            </a:fontRef>
+          </p:style>
+          <p:txBody>
+            <a:bodyPr rtlCol="0" anchor="ctr"/>
+            <a:lstStyle/>
+            <a:p>
+              <a:pPr algn="ctr"/>
+              <a:endParaRPr lang="en-CN" sz="3164"/>
+            </a:p>
+          </p:txBody>
+        </p:sp>
+        <p:sp>
+          <p:nvSpPr>
+            <p:cNvPr id="29" name="Rectangle 28">
+              <a:extLst>
+                <a:ext uri="{FF2B5EF4-FFF2-40B4-BE49-F238E27FC236}">
+                  <a16:creationId xmlns:a16="http://schemas.microsoft.com/office/drawing/2014/main" id="{4D8CC513-9CD5-E09E-FFF3-3908E26ECC4F}"/>
+                </a:ext>
+              </a:extLst>
+            </p:cNvPr>
+            <p:cNvSpPr/>
+            <p:nvPr/>
+          </p:nvSpPr>
+          <p:spPr>
+            <a:xfrm>
+              <a:off x="4757956" y="6059147"/>
+              <a:ext cx="2089410" cy="36000"/>
+            </a:xfrm>
+            <a:prstGeom prst="rect">
+              <a:avLst/>
+            </a:prstGeom>
+            <a:solidFill>
+              <a:schemeClr val="bg1"/>
+            </a:solidFill>
+            <a:ln>
+              <a:noFill/>
+            </a:ln>
+          </p:spPr>
+          <p:style>
+            <a:lnRef idx="2">
+              <a:schemeClr val="accent1">
+                <a:shade val="15000"/>
+              </a:schemeClr>
+            </a:lnRef>
+            <a:fillRef idx="1">
+              <a:schemeClr val="accent1"/>
+            </a:fillRef>
+            <a:effectRef idx="0">
+              <a:schemeClr val="accent1"/>
+            </a:effectRef>
+            <a:fontRef idx="minor">
+              <a:schemeClr val="lt1"/>
+            </a:fontRef>
+          </p:style>
+          <p:txBody>
+            <a:bodyPr rtlCol="0" anchor="ctr"/>
+            <a:lstStyle/>
+            <a:p>
+              <a:pPr algn="ctr"/>
+              <a:endParaRPr lang="en-CN" sz="3164"/>
+            </a:p>
+          </p:txBody>
+        </p:sp>
+        <p:sp>
+          <p:nvSpPr>
+            <p:cNvPr id="35" name="Rectangle 34">
+              <a:extLst>
+                <a:ext uri="{FF2B5EF4-FFF2-40B4-BE49-F238E27FC236}">
+                  <a16:creationId xmlns:a16="http://schemas.microsoft.com/office/drawing/2014/main" id="{A39E15FF-4F01-6BA3-531C-6303BDBB684D}"/>
+                </a:ext>
+              </a:extLst>
+            </p:cNvPr>
+            <p:cNvSpPr/>
+            <p:nvPr/>
+          </p:nvSpPr>
+          <p:spPr>
+            <a:xfrm>
+              <a:off x="4757956" y="6186020"/>
+              <a:ext cx="2089410" cy="36000"/>
+            </a:xfrm>
+            <a:prstGeom prst="rect">
+              <a:avLst/>
+            </a:prstGeom>
+            <a:solidFill>
+              <a:schemeClr val="bg1"/>
+            </a:solidFill>
+            <a:ln>
+              <a:noFill/>
+            </a:ln>
+          </p:spPr>
+          <p:style>
+            <a:lnRef idx="2">
+              <a:schemeClr val="accent1">
+                <a:shade val="15000"/>
+              </a:schemeClr>
+            </a:lnRef>
+            <a:fillRef idx="1">
+              <a:schemeClr val="accent1"/>
+            </a:fillRef>
+            <a:effectRef idx="0">
+              <a:schemeClr val="accent1"/>
+            </a:effectRef>
+            <a:fontRef idx="minor">
+              <a:schemeClr val="lt1"/>
+            </a:fontRef>
+          </p:style>
+          <p:txBody>
+            <a:bodyPr rtlCol="0" anchor="ctr"/>
+            <a:lstStyle/>
+            <a:p>
+              <a:pPr algn="ctr"/>
+              <a:endParaRPr lang="en-CN" sz="3164"/>
+            </a:p>
+          </p:txBody>
+        </p:sp>
+      </p:grpSp>
+      <p:sp>
+        <p:nvSpPr>
+          <p:cNvPr id="7" name="Rectangle 6">
+            <a:extLst>
+              <a:ext uri="{FF2B5EF4-FFF2-40B4-BE49-F238E27FC236}">
+                <a16:creationId xmlns:a16="http://schemas.microsoft.com/office/drawing/2014/main" id="{15EC01DB-882E-D794-CC54-2A90147D0454}"/>
+              </a:ext>
+            </a:extLst>
+          </p:cNvPr>
+          <p:cNvSpPr/>
+          <p:nvPr/>
+        </p:nvSpPr>
+        <p:spPr>
+          <a:xfrm>
+            <a:off x="8820125" y="2832420"/>
+            <a:ext cx="2819329" cy="2038589"/>
+          </a:xfrm>
+          <a:prstGeom prst="rect">
+            <a:avLst/>
+          </a:prstGeom>
+          <a:solidFill>
+            <a:schemeClr val="bg1"/>
+          </a:solidFill>
+          <a:ln>
+            <a:noFill/>
+          </a:ln>
+        </p:spPr>
+        <p:style>
+          <a:lnRef idx="2">
+            <a:schemeClr val="accent1">
+              <a:shade val="15000"/>
+            </a:schemeClr>
+          </a:lnRef>
+          <a:fillRef idx="1">
+            <a:schemeClr val="accent1"/>
+          </a:fillRef>
+          <a:effectRef idx="0">
+            <a:schemeClr val="accent1"/>
+          </a:effectRef>
+          <a:fontRef idx="minor">
+            <a:schemeClr val="lt1"/>
+          </a:fontRef>
+        </p:style>
+        <p:txBody>
+          <a:bodyPr rtlCol="0" anchor="ctr"/>
+          <a:lstStyle/>
+          <a:p>
+            <a:pPr algn="ctr"/>
+            <a:endParaRPr lang="en-CN" sz="3164"/>
+          </a:p>
+        </p:txBody>
+      </p:sp>
+      <p:sp>
+        <p:nvSpPr>
+          <p:cNvPr id="8" name="TextBox 7">
+            <a:extLst>
+              <a:ext uri="{FF2B5EF4-FFF2-40B4-BE49-F238E27FC236}">
+                <a16:creationId xmlns:a16="http://schemas.microsoft.com/office/drawing/2014/main" id="{1663AFF3-090B-44A8-0FCC-E28E0200DA76}"/>
+              </a:ext>
+            </a:extLst>
+          </p:cNvPr>
+          <p:cNvSpPr txBox="1">
+            <a:spLocks noChangeAspect="1"/>
+          </p:cNvSpPr>
+          <p:nvPr/>
+        </p:nvSpPr>
+        <p:spPr>
+          <a:xfrm>
+            <a:off x="8450384" y="2190989"/>
+            <a:ext cx="4752602" cy="4548851"/>
+          </a:xfrm>
+          <a:prstGeom prst="rect">
+            <a:avLst/>
+          </a:prstGeom>
+          <a:noFill/>
+          <a:ln w="57150">
+            <a:noFill/>
+          </a:ln>
+          <a:effectLst>
+            <a:outerShdw blurRad="50800" dist="38100" dir="2700000" algn="tl" rotWithShape="0">
+              <a:prstClr val="black">
+                <a:alpha val="40000"/>
+              </a:prstClr>
+            </a:outerShdw>
+          </a:effectLst>
+        </p:spPr>
+        <p:txBody>
+          <a:bodyPr wrap="none" rtlCol="0">
+            <a:normAutofit/>
+          </a:bodyPr>
+          <a:lstStyle/>
+          <a:p>
+            <a:r>
+              <a:rPr lang="en-CN" sz="29172" b="1" i="1" kern="800" spc="-1404" dirty="0">
                 <a:ln w="15875">
                   <a:solidFill>
                     <a:srgbClr val="0070C0"/>
@@ -6012,11 +5969,31 @@
                 </a:effectLst>
                 <a:latin typeface="Arial" panose="020B0604020202020204" pitchFamily="34" charset="0"/>
                 <a:cs typeface="Arial" panose="020B0604020202020204" pitchFamily="34" charset="0"/>
-              </a:endParaRPr>
-            </a:p>
-          </p:txBody>
-        </p:sp>
-      </p:grpSp>
+              </a:rPr>
+              <a:t>NL</a:t>
+            </a:r>
+            <a:endParaRPr lang="en-CN" sz="20209" b="1" i="1" kern="800" spc="-1404" dirty="0">
+              <a:ln w="15875">
+                <a:solidFill>
+                  <a:srgbClr val="0070C0"/>
+                </a:solidFill>
+              </a:ln>
+              <a:solidFill>
+                <a:srgbClr val="0070C0"/>
+              </a:solidFill>
+              <a:effectLst>
+                <a:outerShdw blurRad="50800" dist="38100" dir="2700000" sx="109000" sy="109000" algn="ctr" rotWithShape="0">
+                  <a:srgbClr val="000000">
+                    <a:alpha val="43137"/>
+                  </a:srgbClr>
+                </a:outerShdw>
+              </a:effectLst>
+              <a:latin typeface="Arial" panose="020B0604020202020204" pitchFamily="34" charset="0"/>
+              <a:cs typeface="Arial" panose="020B0604020202020204" pitchFamily="34" charset="0"/>
+            </a:endParaRPr>
+          </a:p>
+        </p:txBody>
+      </p:sp>
       <p:sp>
         <p:nvSpPr>
           <p:cNvPr id="19" name="TextBox 18">
@@ -6031,8 +6008,8 @@
         </p:nvSpPr>
         <p:spPr>
           <a:xfrm>
-            <a:off x="15157044" y="2978625"/>
-            <a:ext cx="18969298" cy="3000821"/>
+            <a:off x="15115819" y="2965003"/>
+            <a:ext cx="18621775" cy="3000821"/>
           </a:xfrm>
           <a:prstGeom prst="rect">
             <a:avLst/>
@@ -6040,11 +6017,12 @@
           <a:noFill/>
         </p:spPr>
         <p:txBody>
-          <a:bodyPr wrap="square">
+          <a:bodyPr wrap="square" spcCol="54000">
             <a:spAutoFit/>
           </a:bodyPr>
           <a:lstStyle/>
           <a:p>
+            <a:pPr algn="dist"/>
             <a:r>
               <a:rPr lang="en-CN" sz="14500" b="1" dirty="0">
                 <a:solidFill>
@@ -6059,7 +6037,7 @@
           <a:p>
             <a:pPr algn="dist"/>
             <a:r>
-              <a:rPr lang="en-US" sz="4400" b="1" dirty="0">
+              <a:rPr lang="en-US" sz="4400" dirty="0">
                 <a:ln w="34925">
                   <a:solidFill>
                     <a:schemeClr val="accent1"/>

</xml_diff>